<commit_message>
trusted certificate (solo ProxyRealizzatore)
</commit_message>
<xml_diff>
--- a/doc/Introduzione.pptx
+++ b/doc/Introduzione.pptx
@@ -2,27 +2,27 @@
 <file path=ppt/presentation.xml><?xml version="1.0" encoding="utf-8"?>
 <p:presentation xmlns:a="http://schemas.openxmlformats.org/drawingml/2006/main" xmlns:r="http://schemas.openxmlformats.org/officeDocument/2006/relationships" xmlns:p="http://schemas.openxmlformats.org/presentationml/2006/main" autoCompressPictures="0">
   <p:sldMasterIdLst>
-    <p:sldMasterId id="2147483672" r:id="rId3"/>
+    <p:sldMasterId id="2147483672" r:id="rId4"/>
   </p:sldMasterIdLst>
   <p:notesMasterIdLst>
-    <p:notesMasterId r:id="rId16"/>
+    <p:notesMasterId r:id="rId17"/>
   </p:notesMasterIdLst>
   <p:handoutMasterIdLst>
-    <p:handoutMasterId r:id="rId17"/>
+    <p:handoutMasterId r:id="rId18"/>
   </p:handoutMasterIdLst>
   <p:sldIdLst>
-    <p:sldId id="256" r:id="rId4"/>
-    <p:sldId id="261" r:id="rId5"/>
-    <p:sldId id="259" r:id="rId6"/>
-    <p:sldId id="262" r:id="rId7"/>
-    <p:sldId id="263" r:id="rId8"/>
-    <p:sldId id="264" r:id="rId9"/>
-    <p:sldId id="265" r:id="rId10"/>
-    <p:sldId id="266" r:id="rId11"/>
-    <p:sldId id="267" r:id="rId12"/>
-    <p:sldId id="268" r:id="rId13"/>
-    <p:sldId id="269" r:id="rId14"/>
-    <p:sldId id="270" r:id="rId15"/>
+    <p:sldId id="256" r:id="rId5"/>
+    <p:sldId id="261" r:id="rId6"/>
+    <p:sldId id="259" r:id="rId7"/>
+    <p:sldId id="262" r:id="rId8"/>
+    <p:sldId id="263" r:id="rId9"/>
+    <p:sldId id="264" r:id="rId10"/>
+    <p:sldId id="265" r:id="rId11"/>
+    <p:sldId id="266" r:id="rId12"/>
+    <p:sldId id="267" r:id="rId13"/>
+    <p:sldId id="268" r:id="rId14"/>
+    <p:sldId id="269" r:id="rId15"/>
+    <p:sldId id="270" r:id="rId16"/>
   </p:sldIdLst>
   <p:sldSz cx="12192000" cy="6858000"/>
   <p:notesSz cx="6858000" cy="9144000"/>
@@ -8859,12 +8859,12 @@
           <a:lstStyle/>
           <a:p>
             <a:r>
-              <a:rPr lang="en-US" sz="6000" dirty="0" err="1">
+              <a:rPr lang="en-US" sz="6000" u="sng" dirty="0">
                 <a:solidFill>
                   <a:schemeClr val="bg1"/>
                 </a:solidFill>
               </a:rPr>
-              <a:t>Lightining</a:t>
+              <a:t>Lightning</a:t>
             </a:r>
             <a:r>
               <a:rPr lang="en-US" sz="6000" dirty="0">
@@ -9214,6 +9214,125 @@
               </a:rPr>
               <a:t>Giuseppe DE Rosa</a:t>
             </a:r>
+          </a:p>
+        </p:txBody>
+      </p:sp>
+      <p:sp>
+        <p:nvSpPr>
+          <p:cNvPr id="4" name="Rectangle 1">
+            <a:extLst>
+              <a:ext uri="{FF2B5EF4-FFF2-40B4-BE49-F238E27FC236}">
+                <a16:creationId xmlns:a16="http://schemas.microsoft.com/office/drawing/2014/main" id="{FDF3A9AF-61FA-65AB-7CDE-35E3E41D1A04}"/>
+              </a:ext>
+            </a:extLst>
+          </p:cNvPr>
+          <p:cNvSpPr>
+            <a:spLocks noChangeArrowheads="1"/>
+          </p:cNvSpPr>
+          <p:nvPr/>
+        </p:nvSpPr>
+        <p:spPr bwMode="auto">
+          <a:xfrm>
+            <a:off x="0" y="0"/>
+            <a:ext cx="12192000" cy="457200"/>
+          </a:xfrm>
+          <a:prstGeom prst="rect">
+            <a:avLst/>
+          </a:prstGeom>
+          <a:noFill/>
+          <a:ln>
+            <a:noFill/>
+          </a:ln>
+          <a:effectLst/>
+          <a:extLst>
+            <a:ext uri="{909E8E84-426E-40DD-AFC4-6F175D3DCCD1}">
+              <a14:hiddenFill xmlns:a14="http://schemas.microsoft.com/office/drawing/2010/main">
+                <a:solidFill>
+                  <a:schemeClr val="accent1"/>
+                </a:solidFill>
+              </a14:hiddenFill>
+            </a:ext>
+            <a:ext uri="{91240B29-F687-4F45-9708-019B960494DF}">
+              <a14:hiddenLine xmlns:a14="http://schemas.microsoft.com/office/drawing/2010/main" w="9525">
+                <a:solidFill>
+                  <a:schemeClr val="tx1"/>
+                </a:solidFill>
+                <a:miter lim="800000"/>
+                <a:headEnd/>
+                <a:tailEnd/>
+              </a14:hiddenLine>
+            </a:ext>
+            <a:ext uri="{AF507438-7753-43E0-B8FC-AC1667EBCBE1}">
+              <a14:hiddenEffects xmlns:a14="http://schemas.microsoft.com/office/drawing/2010/main">
+                <a:effectLst>
+                  <a:outerShdw dist="35921" dir="2700000" algn="ctr" rotWithShape="0">
+                    <a:schemeClr val="bg2"/>
+                  </a:outerShdw>
+                </a:effectLst>
+              </a14:hiddenEffects>
+            </a:ext>
+          </a:extLst>
+        </p:spPr>
+        <p:txBody>
+          <a:bodyPr vert="horz" wrap="none" lIns="91440" tIns="45720" rIns="91440" bIns="45720" numCol="1" anchor="ctr" anchorCtr="0" compatLnSpc="1">
+            <a:prstTxWarp prst="textNoShape">
+              <a:avLst/>
+            </a:prstTxWarp>
+            <a:spAutoFit/>
+          </a:bodyPr>
+          <a:lstStyle/>
+          <a:p>
+            <a:pPr marL="0" marR="0" lvl="0" indent="0" algn="l" defTabSz="914400" rtl="0" eaLnBrk="0" fontAlgn="base" latinLnBrk="0" hangingPunct="0">
+              <a:lnSpc>
+                <a:spcPct val="100000"/>
+              </a:lnSpc>
+              <a:spcBef>
+                <a:spcPct val="0"/>
+              </a:spcBef>
+              <a:spcAft>
+                <a:spcPct val="0"/>
+              </a:spcAft>
+              <a:buClrTx/>
+              <a:buSzTx/>
+              <a:buFontTx/>
+              <a:buNone/>
+              <a:tabLst/>
+            </a:pPr>
+            <a:r>
+              <a:rPr kumimoji="0" lang="it-IT" altLang="it-IT" sz="1000" b="0" i="0" u="none" strike="noStrike" cap="none" normalizeH="0" baseline="0">
+                <a:ln>
+                  <a:noFill/>
+                </a:ln>
+                <a:solidFill>
+                  <a:schemeClr val="tx1"/>
+                </a:solidFill>
+                <a:effectLst/>
+                <a:latin typeface="Arial Unicode MS"/>
+              </a:rPr>
+              <a:t>lightning</a:t>
+            </a:r>
+            <a:r>
+              <a:rPr kumimoji="0" lang="it-IT" altLang="it-IT" sz="800" b="0" i="0" u="none" strike="noStrike" cap="none" normalizeH="0" baseline="0">
+                <a:ln>
+                  <a:noFill/>
+                </a:ln>
+                <a:solidFill>
+                  <a:schemeClr val="tx1"/>
+                </a:solidFill>
+                <a:effectLst/>
+              </a:rPr>
+              <a:t> </a:t>
+            </a:r>
+            <a:endParaRPr kumimoji="0" lang="it-IT" altLang="it-IT" sz="1800" b="0" i="0" u="none" strike="noStrike" cap="none" normalizeH="0" baseline="0">
+              <a:ln>
+                <a:noFill/>
+              </a:ln>
+              <a:solidFill>
+                <a:schemeClr val="tx1"/>
+              </a:solidFill>
+              <a:effectLst/>
+              <a:latin typeface="Arial" panose="020B0604020202020204" pitchFamily="34" charset="0"/>
+            </a:endParaRPr>
           </a:p>
         </p:txBody>
       </p:sp>
@@ -9717,8 +9836,8 @@
         </p:nvSpPr>
         <p:spPr>
           <a:xfrm>
-            <a:off x="575894" y="2256693"/>
-            <a:ext cx="11029615" cy="4378570"/>
+            <a:off x="438540" y="1950098"/>
+            <a:ext cx="11166970" cy="4685165"/>
           </a:xfrm>
           <a:prstGeom prst="rect">
             <a:avLst/>
@@ -9726,7 +9845,7 @@
         </p:spPr>
         <p:txBody>
           <a:bodyPr>
-            <a:normAutofit/>
+            <a:normAutofit lnSpcReduction="10000"/>
           </a:bodyPr>
           <a:lstStyle>
             <a:lvl1pPr marL="306000" indent="-306000" algn="l" defTabSz="457200" rtl="0" eaLnBrk="1" latinLnBrk="0" hangingPunct="1">
@@ -10048,6 +10167,36 @@
             <a:r>
               <a:rPr lang="it-IT" b="1" dirty="0"/>
               <a:t>Client Android: </a:t>
+            </a:r>
+          </a:p>
+          <a:p>
+            <a:pPr lvl="1">
+              <a:buFont typeface="Wingdings 2" panose="05020102010507070707" pitchFamily="18" charset="2"/>
+              <a:buChar char=""/>
+            </a:pPr>
+            <a:r>
+              <a:rPr lang="it-IT" dirty="0"/>
+              <a:t>Implementa ad hoc una comunicazione SSL con i Proxy senza fare uso di librerie esterne</a:t>
+            </a:r>
+          </a:p>
+          <a:p>
+            <a:pPr lvl="1">
+              <a:buFont typeface="Wingdings 2" panose="05020102010507070707" pitchFamily="18" charset="2"/>
+              <a:buChar char=""/>
+            </a:pPr>
+            <a:r>
+              <a:rPr lang="it-IT" dirty="0"/>
+              <a:t>Verifica il certificato pubblico dei proxy ad ogni comunicazione, per avere certezza del mittente/destinatario</a:t>
+            </a:r>
+          </a:p>
+          <a:p>
+            <a:pPr lvl="1">
+              <a:buFont typeface="Wingdings 2" panose="05020102010507070707" pitchFamily="18" charset="2"/>
+              <a:buChar char=""/>
+            </a:pPr>
+            <a:r>
+              <a:rPr lang="it-IT" dirty="0"/>
+              <a:t>Non memorizza nessun tipo di informazione sensibile o che possa ritenersi pericolosa per la funzionalità del sistema</a:t>
             </a:r>
           </a:p>
         </p:txBody>
@@ -10104,12 +10253,132 @@
           <a:lstStyle/>
           <a:p>
             <a:r>
-              <a:rPr lang="it-IT"/>
-              <a:t>INSERIRE IMMAGINI DI ESEMPIO</a:t>
+              <a:rPr lang="it-IT" dirty="0"/>
+              <a:t>Lightning Order</a:t>
             </a:r>
           </a:p>
         </p:txBody>
       </p:sp>
+      <p:pic>
+        <p:nvPicPr>
+          <p:cNvPr id="4" name="Immagine 3">
+            <a:extLst>
+              <a:ext uri="{FF2B5EF4-FFF2-40B4-BE49-F238E27FC236}">
+                <a16:creationId xmlns:a16="http://schemas.microsoft.com/office/drawing/2014/main" id="{22A3BF91-F114-2A93-FB8E-EAB4E4D7B22D}"/>
+              </a:ext>
+            </a:extLst>
+          </p:cNvPr>
+          <p:cNvPicPr>
+            <a:picLocks noChangeAspect="1"/>
+          </p:cNvPicPr>
+          <p:nvPr/>
+        </p:nvPicPr>
+        <p:blipFill>
+          <a:blip r:embed="rId2"/>
+          <a:stretch>
+            <a:fillRect/>
+          </a:stretch>
+        </p:blipFill>
+        <p:spPr>
+          <a:xfrm>
+            <a:off x="910938" y="2247174"/>
+            <a:ext cx="1992537" cy="4318218"/>
+          </a:xfrm>
+          <a:prstGeom prst="rect">
+            <a:avLst/>
+          </a:prstGeom>
+        </p:spPr>
+      </p:pic>
+      <p:pic>
+        <p:nvPicPr>
+          <p:cNvPr id="6" name="Immagine 5">
+            <a:extLst>
+              <a:ext uri="{FF2B5EF4-FFF2-40B4-BE49-F238E27FC236}">
+                <a16:creationId xmlns:a16="http://schemas.microsoft.com/office/drawing/2014/main" id="{041AE19D-4F48-63F6-57FA-0E5EB00FE2DD}"/>
+              </a:ext>
+            </a:extLst>
+          </p:cNvPr>
+          <p:cNvPicPr>
+            <a:picLocks noChangeAspect="1"/>
+          </p:cNvPicPr>
+          <p:nvPr/>
+        </p:nvPicPr>
+        <p:blipFill>
+          <a:blip r:embed="rId3"/>
+          <a:stretch>
+            <a:fillRect/>
+          </a:stretch>
+        </p:blipFill>
+        <p:spPr>
+          <a:xfrm>
+            <a:off x="3221456" y="2247174"/>
+            <a:ext cx="2056543" cy="4456932"/>
+          </a:xfrm>
+          <a:prstGeom prst="rect">
+            <a:avLst/>
+          </a:prstGeom>
+        </p:spPr>
+      </p:pic>
+      <p:pic>
+        <p:nvPicPr>
+          <p:cNvPr id="8" name="Immagine 7">
+            <a:extLst>
+              <a:ext uri="{FF2B5EF4-FFF2-40B4-BE49-F238E27FC236}">
+                <a16:creationId xmlns:a16="http://schemas.microsoft.com/office/drawing/2014/main" id="{2859208B-1405-20DE-674B-8BB3D6532D21}"/>
+              </a:ext>
+            </a:extLst>
+          </p:cNvPr>
+          <p:cNvPicPr>
+            <a:picLocks noChangeAspect="1"/>
+          </p:cNvPicPr>
+          <p:nvPr/>
+        </p:nvPicPr>
+        <p:blipFill>
+          <a:blip r:embed="rId4"/>
+          <a:stretch>
+            <a:fillRect/>
+          </a:stretch>
+        </p:blipFill>
+        <p:spPr>
+          <a:xfrm>
+            <a:off x="5968228" y="2247174"/>
+            <a:ext cx="1667301" cy="3613369"/>
+          </a:xfrm>
+          <a:prstGeom prst="rect">
+            <a:avLst/>
+          </a:prstGeom>
+        </p:spPr>
+      </p:pic>
+      <p:pic>
+        <p:nvPicPr>
+          <p:cNvPr id="10" name="Immagine 9" descr="Immagine che contiene tavolo&#10;&#10;Descrizione generata automaticamente">
+            <a:extLst>
+              <a:ext uri="{FF2B5EF4-FFF2-40B4-BE49-F238E27FC236}">
+                <a16:creationId xmlns:a16="http://schemas.microsoft.com/office/drawing/2014/main" id="{6EEE07E5-43A8-464D-66AC-EAA346270876}"/>
+              </a:ext>
+            </a:extLst>
+          </p:cNvPr>
+          <p:cNvPicPr>
+            <a:picLocks noChangeAspect="1"/>
+          </p:cNvPicPr>
+          <p:nvPr/>
+        </p:nvPicPr>
+        <p:blipFill>
+          <a:blip r:embed="rId5"/>
+          <a:stretch>
+            <a:fillRect/>
+          </a:stretch>
+        </p:blipFill>
+        <p:spPr>
+          <a:xfrm>
+            <a:off x="8624229" y="2247174"/>
+            <a:ext cx="1803449" cy="3908427"/>
+          </a:xfrm>
+          <a:prstGeom prst="rect">
+            <a:avLst/>
+          </a:prstGeom>
+        </p:spPr>
+      </p:pic>
     </p:spTree>
     <p:extLst>
       <p:ext uri="{BB962C8B-B14F-4D97-AF65-F5344CB8AC3E}">
@@ -14321,6 +14590,12 @@
 </file>
 
 <file path=customXml/item1.xml><?xml version="1.0" encoding="utf-8"?>
+<p:properties xmlns:p="http://schemas.microsoft.com/office/2006/metadata/properties" xmlns:xsi="http://www.w3.org/2001/XMLSchema-instance" xmlns:pc="http://schemas.microsoft.com/office/infopath/2007/PartnerControls">
+  <documentManagement/>
+</p:properties>
+</file>
+
+<file path=customXml/item2.xml><?xml version="1.0" encoding="utf-8"?>
 <ct:contentTypeSchema xmlns:ct="http://schemas.microsoft.com/office/2006/metadata/contentType" xmlns:ma="http://schemas.microsoft.com/office/2006/metadata/properties/metaAttributes" ct:_="" ma:_="" ma:contentTypeName="Documento" ma:contentTypeID="0x0101001FF3CDC142E59F46976220B5CA0CB5FC" ma:contentTypeVersion="2" ma:contentTypeDescription="Creare un nuovo documento." ma:contentTypeScope="" ma:versionID="0b8a8c1c321c01bcbeb872dfd6c1bb21">
   <xsd:schema xmlns:xsd="http://www.w3.org/2001/XMLSchema" xmlns:xs="http://www.w3.org/2001/XMLSchema" xmlns:p="http://schemas.microsoft.com/office/2006/metadata/properties" xmlns:ns2="78bd1115-c349-4e94-811d-d06a7ae9090b" targetNamespace="http://schemas.microsoft.com/office/2006/metadata/properties" ma:root="true" ma:fieldsID="e4ae236ed4d02964ec2f225fff35efa2" ns2:_="">
     <xsd:import namespace="78bd1115-c349-4e94-811d-d06a7ae9090b"/>
@@ -14452,7 +14727,7 @@
 </ct:contentTypeSchema>
 </file>
 
-<file path=customXml/item2.xml><?xml version="1.0" encoding="utf-8"?>
+<file path=customXml/item3.xml><?xml version="1.0" encoding="utf-8"?>
 <?mso-contentType ?>
 <FormTemplates xmlns="http://schemas.microsoft.com/sharepoint/v3/contenttype/forms">
   <Display>DocumentLibraryForm</Display>
@@ -14461,24 +14736,37 @@
 </FormTemplates>
 </file>
 
-<file path=customXml/item3.xml><?xml version="1.0" encoding="utf-8"?>
-<p:properties xmlns:p="http://schemas.microsoft.com/office/2006/metadata/properties" xmlns:xsi="http://www.w3.org/2001/XMLSchema-instance" xmlns:pc="http://schemas.microsoft.com/office/infopath/2007/PartnerControls">
-  <documentManagement/>
-</p:properties>
-</file>
-
 <file path=customXml/itemProps1.xml><?xml version="1.0" encoding="utf-8"?>
-<ds:datastoreItem xmlns:ds="http://schemas.openxmlformats.org/officeDocument/2006/customXml" ds:itemID="{E7425A1D-0BE3-43F0-B66C-359589923F24}"/>
+<ds:datastoreItem xmlns:ds="http://schemas.openxmlformats.org/officeDocument/2006/customXml" ds:itemID="{2730E544-50C2-46C9-A58D-92D5B23B7F2E}">
+  <ds:schemaRefs>
+    <ds:schemaRef ds:uri="http://schemas.microsoft.com/office/2006/metadata/properties"/>
+    <ds:schemaRef ds:uri="http://schemas.microsoft.com/office/infopath/2007/PartnerControls"/>
+  </ds:schemaRefs>
+</ds:datastoreItem>
 </file>
 
 <file path=customXml/itemProps2.xml><?xml version="1.0" encoding="utf-8"?>
+<ds:datastoreItem xmlns:ds="http://schemas.openxmlformats.org/officeDocument/2006/customXml" ds:itemID="{45463A4F-5A3B-4F75-90C2-528010097202}">
+  <ds:schemaRefs>
+    <ds:schemaRef ds:uri="http://schemas.microsoft.com/office/2006/metadata/contentType"/>
+    <ds:schemaRef ds:uri="http://schemas.microsoft.com/office/2006/metadata/properties/metaAttributes"/>
+    <ds:schemaRef ds:uri="http://www.w3.org/2001/XMLSchema"/>
+    <ds:schemaRef ds:uri="http://schemas.microsoft.com/office/2006/metadata/properties"/>
+    <ds:schemaRef ds:uri="78bd1115-c349-4e94-811d-d06a7ae9090b"/>
+    <ds:schemaRef ds:uri="http://schemas.microsoft.com/office/2006/documentManagement/types"/>
+    <ds:schemaRef ds:uri="http://schemas.microsoft.com/office/infopath/2007/PartnerControls"/>
+    <ds:schemaRef ds:uri="http://schemas.openxmlformats.org/package/2006/metadata/core-properties"/>
+    <ds:schemaRef ds:uri="http://purl.org/dc/elements/1.1/"/>
+    <ds:schemaRef ds:uri="http://purl.org/dc/terms/"/>
+    <ds:schemaRef ds:uri="http://schemas.microsoft.com/internal/obd"/>
+  </ds:schemaRefs>
+</ds:datastoreItem>
+</file>
+
+<file path=customXml/itemProps3.xml><?xml version="1.0" encoding="utf-8"?>
 <ds:datastoreItem xmlns:ds="http://schemas.openxmlformats.org/officeDocument/2006/customXml" ds:itemID="{55895A41-F65A-4D7F-8780-A8AB39E16755}">
   <ds:schemaRefs>
     <ds:schemaRef ds:uri="http://schemas.microsoft.com/sharepoint/v3/contenttype/forms"/>
   </ds:schemaRefs>
 </ds:datastoreItem>
-</file>
-
-<file path=customXml/itemProps3.xml><?xml version="1.0" encoding="utf-8"?>
-<ds:datastoreItem xmlns:ds="http://schemas.openxmlformats.org/officeDocument/2006/customXml" ds:itemID="{ACF9F030-0467-40CC-9D9F-F4D90EA8BD81}"/>
 </file>
</xml_diff>